<commit_message>
Gestión de Recursos Humanos
Documento de gestión de recursos humanos
</commit_message>
<xml_diff>
--- a/Gerencia del Proyecto/Roles/OrganigramaEquipo.pptx
+++ b/Gerencia del Proyecto/Roles/OrganigramaEquipo.pptx
@@ -243,7 +243,7 @@
           <a:p>
             <a:fld id="{EF8C5229-5677-4191-B782-B48EE3907174}" type="datetimeFigureOut">
               <a:rPr lang="es-CO" smtClean="0"/>
-              <a:t>5/04/18</a:t>
+              <a:t>31/05/2018</a:t>
             </a:fld>
             <a:endParaRPr lang="es-CO"/>
           </a:p>
@@ -413,7 +413,7 @@
           <a:p>
             <a:fld id="{EF8C5229-5677-4191-B782-B48EE3907174}" type="datetimeFigureOut">
               <a:rPr lang="es-CO" smtClean="0"/>
-              <a:t>5/04/18</a:t>
+              <a:t>31/05/2018</a:t>
             </a:fld>
             <a:endParaRPr lang="es-CO"/>
           </a:p>
@@ -593,7 +593,7 @@
           <a:p>
             <a:fld id="{EF8C5229-5677-4191-B782-B48EE3907174}" type="datetimeFigureOut">
               <a:rPr lang="es-CO" smtClean="0"/>
-              <a:t>5/04/18</a:t>
+              <a:t>31/05/2018</a:t>
             </a:fld>
             <a:endParaRPr lang="es-CO"/>
           </a:p>
@@ -763,7 +763,7 @@
           <a:p>
             <a:fld id="{EF8C5229-5677-4191-B782-B48EE3907174}" type="datetimeFigureOut">
               <a:rPr lang="es-CO" smtClean="0"/>
-              <a:t>5/04/18</a:t>
+              <a:t>31/05/2018</a:t>
             </a:fld>
             <a:endParaRPr lang="es-CO"/>
           </a:p>
@@ -1009,7 +1009,7 @@
           <a:p>
             <a:fld id="{EF8C5229-5677-4191-B782-B48EE3907174}" type="datetimeFigureOut">
               <a:rPr lang="es-CO" smtClean="0"/>
-              <a:t>5/04/18</a:t>
+              <a:t>31/05/2018</a:t>
             </a:fld>
             <a:endParaRPr lang="es-CO"/>
           </a:p>
@@ -1241,7 +1241,7 @@
           <a:p>
             <a:fld id="{EF8C5229-5677-4191-B782-B48EE3907174}" type="datetimeFigureOut">
               <a:rPr lang="es-CO" smtClean="0"/>
-              <a:t>5/04/18</a:t>
+              <a:t>31/05/2018</a:t>
             </a:fld>
             <a:endParaRPr lang="es-CO"/>
           </a:p>
@@ -1608,7 +1608,7 @@
           <a:p>
             <a:fld id="{EF8C5229-5677-4191-B782-B48EE3907174}" type="datetimeFigureOut">
               <a:rPr lang="es-CO" smtClean="0"/>
-              <a:t>5/04/18</a:t>
+              <a:t>31/05/2018</a:t>
             </a:fld>
             <a:endParaRPr lang="es-CO"/>
           </a:p>
@@ -1726,7 +1726,7 @@
           <a:p>
             <a:fld id="{EF8C5229-5677-4191-B782-B48EE3907174}" type="datetimeFigureOut">
               <a:rPr lang="es-CO" smtClean="0"/>
-              <a:t>5/04/18</a:t>
+              <a:t>31/05/2018</a:t>
             </a:fld>
             <a:endParaRPr lang="es-CO"/>
           </a:p>
@@ -1821,7 +1821,7 @@
           <a:p>
             <a:fld id="{EF8C5229-5677-4191-B782-B48EE3907174}" type="datetimeFigureOut">
               <a:rPr lang="es-CO" smtClean="0"/>
-              <a:t>5/04/18</a:t>
+              <a:t>31/05/2018</a:t>
             </a:fld>
             <a:endParaRPr lang="es-CO"/>
           </a:p>
@@ -2098,7 +2098,7 @@
           <a:p>
             <a:fld id="{EF8C5229-5677-4191-B782-B48EE3907174}" type="datetimeFigureOut">
               <a:rPr lang="es-CO" smtClean="0"/>
-              <a:t>5/04/18</a:t>
+              <a:t>31/05/2018</a:t>
             </a:fld>
             <a:endParaRPr lang="es-CO"/>
           </a:p>
@@ -2355,7 +2355,7 @@
           <a:p>
             <a:fld id="{EF8C5229-5677-4191-B782-B48EE3907174}" type="datetimeFigureOut">
               <a:rPr lang="es-CO" smtClean="0"/>
-              <a:t>5/04/18</a:t>
+              <a:t>31/05/2018</a:t>
             </a:fld>
             <a:endParaRPr lang="es-CO"/>
           </a:p>
@@ -2568,7 +2568,7 @@
           <a:p>
             <a:fld id="{EF8C5229-5677-4191-B782-B48EE3907174}" type="datetimeFigureOut">
               <a:rPr lang="es-CO" smtClean="0"/>
-              <a:t>5/04/18</a:t>
+              <a:t>31/05/2018</a:t>
             </a:fld>
             <a:endParaRPr lang="es-CO"/>
           </a:p>
@@ -3143,8 +3143,7 @@
           </a:prstGeom>
           <a:solidFill>
             <a:schemeClr val="accent4">
-              <a:lumMod val="60000"/>
-              <a:lumOff val="40000"/>
+              <a:lumMod val="75000"/>
             </a:schemeClr>
           </a:solidFill>
           <a:ln>
@@ -3223,8 +3222,7 @@
           </a:prstGeom>
           <a:solidFill>
             <a:schemeClr val="accent2">
-              <a:lumMod val="60000"/>
-              <a:lumOff val="40000"/>
+              <a:lumMod val="75000"/>
             </a:schemeClr>
           </a:solidFill>
           <a:ln>
@@ -3377,7 +3375,7 @@
           </a:prstGeom>
           <a:solidFill>
             <a:schemeClr val="accent2">
-              <a:lumMod val="75000"/>
+              <a:lumMod val="50000"/>
             </a:schemeClr>
           </a:solidFill>
           <a:ln>
@@ -3456,8 +3454,7 @@
           </a:prstGeom>
           <a:solidFill>
             <a:schemeClr val="accent4">
-              <a:lumMod val="60000"/>
-              <a:lumOff val="40000"/>
+              <a:lumMod val="50000"/>
             </a:schemeClr>
           </a:solidFill>
           <a:ln>
@@ -3531,8 +3528,7 @@
           </a:prstGeom>
           <a:solidFill>
             <a:schemeClr val="accent2">
-              <a:lumMod val="60000"/>
-              <a:lumOff val="40000"/>
+              <a:lumMod val="75000"/>
             </a:schemeClr>
           </a:solidFill>
           <a:ln>

</xml_diff>